<commit_message>
print settings pred-logic pptx's
</commit_message>
<xml_diff>
--- a/spring16/slidesS16/predicate-logic1.pptx
+++ b/spring16/slidesS16/predicate-logic1.pptx
@@ -29,7 +29,7 @@
     <p:sldId id="285" r:id="rId17"/>
   </p:sldIdLst>
   <p:sldSz cx="9144000" cy="6858000" type="screen4x3"/>
-  <p:notesSz cx="7315200" cy="9601200"/>
+  <p:notesSz cx="9601200" cy="7315200"/>
   <p:custDataLst>
     <p:tags r:id="rId21"/>
   </p:custDataLst>
@@ -199,7 +199,7 @@
         <p:spPr bwMode="auto">
           <a:xfrm>
             <a:off x="0" y="0"/>
-            <a:ext cx="3168650" cy="479425"/>
+            <a:ext cx="4158853" cy="365276"/>
           </a:xfrm>
           <a:prstGeom prst="rect">
             <a:avLst/>
@@ -241,8 +241,8 @@
         </p:nvSpPr>
         <p:spPr bwMode="auto">
           <a:xfrm>
-            <a:off x="4146550" y="0"/>
-            <a:ext cx="3168650" cy="479425"/>
+            <a:off x="5442347" y="0"/>
+            <a:ext cx="4158853" cy="365276"/>
           </a:xfrm>
           <a:prstGeom prst="rect">
             <a:avLst/>
@@ -284,8 +284,8 @@
         </p:nvSpPr>
         <p:spPr bwMode="auto">
           <a:xfrm>
-            <a:off x="0" y="9121775"/>
-            <a:ext cx="3168650" cy="479425"/>
+            <a:off x="0" y="6949924"/>
+            <a:ext cx="4158853" cy="365276"/>
           </a:xfrm>
           <a:prstGeom prst="rect">
             <a:avLst/>
@@ -327,8 +327,8 @@
         </p:nvSpPr>
         <p:spPr bwMode="auto">
           <a:xfrm>
-            <a:off x="4146550" y="9121775"/>
-            <a:ext cx="3168650" cy="479425"/>
+            <a:off x="5442347" y="6949924"/>
+            <a:ext cx="4158853" cy="365276"/>
           </a:xfrm>
           <a:prstGeom prst="rect">
             <a:avLst/>
@@ -412,7 +412,7 @@
         <p:spPr bwMode="auto">
           <a:xfrm>
             <a:off x="0" y="0"/>
-            <a:ext cx="3170238" cy="479425"/>
+            <a:ext cx="4160937" cy="365276"/>
           </a:xfrm>
           <a:prstGeom prst="rect">
             <a:avLst/>
@@ -454,8 +454,8 @@
         </p:nvSpPr>
         <p:spPr bwMode="auto">
           <a:xfrm>
-            <a:off x="4143375" y="0"/>
-            <a:ext cx="3170238" cy="479425"/>
+            <a:off x="5438180" y="0"/>
+            <a:ext cx="4160937" cy="365276"/>
           </a:xfrm>
           <a:prstGeom prst="rect">
             <a:avLst/>
@@ -497,8 +497,8 @@
         </p:nvSpPr>
         <p:spPr bwMode="auto">
           <a:xfrm>
-            <a:off x="1257300" y="720725"/>
-            <a:ext cx="4800600" cy="3600450"/>
+            <a:off x="2971800" y="549275"/>
+            <a:ext cx="3657600" cy="2743200"/>
           </a:xfrm>
           <a:prstGeom prst="rect">
             <a:avLst/>
@@ -527,8 +527,8 @@
         </p:nvSpPr>
         <p:spPr bwMode="auto">
           <a:xfrm>
-            <a:off x="731838" y="4560888"/>
-            <a:ext cx="5851525" cy="4319587"/>
+            <a:off x="960538" y="3474963"/>
+            <a:ext cx="7680127" cy="3291114"/>
           </a:xfrm>
           <a:prstGeom prst="rect">
             <a:avLst/>
@@ -598,8 +598,8 @@
         </p:nvSpPr>
         <p:spPr bwMode="auto">
           <a:xfrm>
-            <a:off x="0" y="9120188"/>
-            <a:ext cx="3170238" cy="479425"/>
+            <a:off x="0" y="6948715"/>
+            <a:ext cx="4160937" cy="365276"/>
           </a:xfrm>
           <a:prstGeom prst="rect">
             <a:avLst/>
@@ -641,8 +641,8 @@
         </p:nvSpPr>
         <p:spPr bwMode="auto">
           <a:xfrm>
-            <a:off x="4143375" y="9120188"/>
-            <a:ext cx="3170238" cy="479425"/>
+            <a:off x="5438180" y="6948715"/>
+            <a:ext cx="4160937" cy="365276"/>
           </a:xfrm>
           <a:prstGeom prst="rect">
             <a:avLst/>
@@ -3342,15 +3342,7 @@
             </a:pPr>
             <a:r>
               <a:rPr lang="en-US" sz="6000" b="0" dirty="0" smtClean="0"/>
-              <a:t>Predicate </a:t>
-            </a:r>
-            <a:r>
-              <a:rPr lang="en-US" sz="6000" b="0" dirty="0" smtClean="0"/>
-              <a:t>Logic, </a:t>
-            </a:r>
-            <a:r>
-              <a:rPr lang="en-US" sz="6000" b="0" dirty="0" smtClean="0"/>
-              <a:t>I</a:t>
+              <a:t>Predicate Logic, I</a:t>
             </a:r>
             <a:endParaRPr lang="en-US" sz="6000" dirty="0">
               <a:solidFill>
@@ -3968,7 +3960,7 @@
           <a:graphicData uri="http://schemas.openxmlformats.org/presentationml/2006/ole">
             <mc:AlternateContent xmlns:mc="http://schemas.openxmlformats.org/markup-compatibility/2006">
               <mc:Choice xmlns:v="urn:schemas-microsoft-com:vml" Requires="v">
-                <p:oleObj spid="_x0000_s527400" name="Equation" r:id="rId4" imgW="1765080" imgH="457200" progId="Equation.DSMT4">
+                <p:oleObj spid="_x0000_s527402" name="Equation" r:id="rId4" imgW="1765080" imgH="457200" progId="Equation.DSMT4">
                   <p:embed/>
                 </p:oleObj>
               </mc:Choice>
@@ -5753,7 +5745,7 @@
           <a:graphicData uri="http://schemas.openxmlformats.org/presentationml/2006/ole">
             <mc:AlternateContent xmlns:mc="http://schemas.openxmlformats.org/markup-compatibility/2006">
               <mc:Choice xmlns:v="urn:schemas-microsoft-com:vml" Requires="v">
-                <p:oleObj spid="_x0000_s479273" name="Equation" r:id="rId4" imgW="164880" imgH="164880" progId="Equation.DSMT4">
+                <p:oleObj spid="_x0000_s479275" name="Equation" r:id="rId4" imgW="164880" imgH="164880" progId="Equation.DSMT4">
                   <p:embed/>
                 </p:oleObj>
               </mc:Choice>
@@ -11786,13 +11778,7 @@
               <a:rPr lang="en-US" sz="4800" dirty="0" smtClean="0">
                 <a:latin typeface="Comic Sans MS" pitchFamily="66" charset="0"/>
               </a:rPr>
-              <a:t>([</a:t>
-            </a:r>
-            <a:r>
-              <a:rPr lang="en-US" sz="4800" dirty="0" smtClean="0">
-                <a:latin typeface="Comic Sans MS" pitchFamily="66" charset="0"/>
-              </a:rPr>
-              <a:t>x</a:t>
+              <a:t>([x</a:t>
             </a:r>
             <a:r>
               <a:rPr lang="en-US" sz="4800" b="1" dirty="0" smtClean="0">
@@ -11805,66 +11791,54 @@
               <a:rPr lang="en-US" sz="4800" dirty="0" smtClean="0">
                 <a:latin typeface="Comic Sans MS" pitchFamily="66" charset="0"/>
               </a:rPr>
-              <a:t>3</a:t>
+              <a:t>3] is </a:t>
             </a:r>
             <a:r>
               <a:rPr lang="en-US" sz="4800" dirty="0" smtClean="0">
-                <a:latin typeface="Comic Sans MS" pitchFamily="66" charset="0"/>
-              </a:rPr>
-              <a:t>] is </a:t>
+                <a:solidFill>
+                  <a:srgbClr val="33CC33"/>
+                </a:solidFill>
+                <a:latin typeface="Comic Sans MS" pitchFamily="66" charset="0"/>
+              </a:rPr>
+              <a:t>T</a:t>
             </a:r>
             <a:r>
               <a:rPr lang="en-US" sz="4800" dirty="0" smtClean="0">
+                <a:latin typeface="Comic Sans MS" pitchFamily="66" charset="0"/>
+              </a:rPr>
+              <a:t> for x=1)</a:t>
+            </a:r>
+          </a:p>
+          <a:p>
+            <a:r>
+              <a:rPr lang="en-US" sz="4800" dirty="0" smtClean="0">
+                <a:solidFill>
+                  <a:srgbClr val="0000FF"/>
+                </a:solidFill>
+                <a:latin typeface="Comic Sans MS" pitchFamily="66" charset="0"/>
+              </a:rPr>
+              <a:t>Q</a:t>
+            </a:r>
+            <a:r>
+              <a:rPr lang="en-US" sz="4800" dirty="0" smtClean="0">
+                <a:latin typeface="Comic Sans MS" pitchFamily="66" charset="0"/>
+              </a:rPr>
+              <a:t>(1) is </a:t>
+            </a:r>
+            <a:r>
+              <a:rPr lang="en-US" sz="4800" dirty="0" smtClean="0">
                 <a:solidFill>
                   <a:srgbClr val="33CC33"/>
                 </a:solidFill>
                 <a:latin typeface="Comic Sans MS" pitchFamily="66" charset="0"/>
               </a:rPr>
-              <a:t>T</a:t>
+              <a:t>T  </a:t>
             </a:r>
             <a:r>
               <a:rPr lang="en-US" sz="4800" dirty="0" smtClean="0">
                 <a:latin typeface="Comic Sans MS" pitchFamily="66" charset="0"/>
               </a:rPr>
-              <a:t> for x=1)</a:t>
-            </a:r>
-          </a:p>
-          <a:p>
-            <a:r>
-              <a:rPr lang="en-US" sz="4800" dirty="0" smtClean="0">
-                <a:solidFill>
-                  <a:srgbClr val="0000FF"/>
-                </a:solidFill>
-                <a:latin typeface="Comic Sans MS" pitchFamily="66" charset="0"/>
-              </a:rPr>
-              <a:t>Q</a:t>
-            </a:r>
-            <a:r>
-              <a:rPr lang="en-US" sz="4800" dirty="0" smtClean="0">
-                <a:latin typeface="Comic Sans MS" pitchFamily="66" charset="0"/>
-              </a:rPr>
-              <a:t>(1) is </a:t>
-            </a:r>
-            <a:r>
-              <a:rPr lang="en-US" sz="4800" dirty="0" smtClean="0">
-                <a:solidFill>
-                  <a:srgbClr val="33CC33"/>
-                </a:solidFill>
-                <a:latin typeface="Comic Sans MS" pitchFamily="66" charset="0"/>
-              </a:rPr>
-              <a:t>T  </a:t>
-            </a:r>
-            <a:r>
-              <a:rPr lang="en-US" sz="4800" dirty="0" smtClean="0">
-                <a:latin typeface="Comic Sans MS" pitchFamily="66" charset="0"/>
-              </a:rPr>
-              <a:t>([</a:t>
-            </a:r>
-            <a:r>
-              <a:rPr lang="en-US" sz="4800" dirty="0" smtClean="0">
-                <a:latin typeface="Comic Sans MS" pitchFamily="66" charset="0"/>
-              </a:rPr>
-              <a:t>x</a:t>
+              <a:t>([x</a:t>
             </a:r>
             <a:r>
               <a:rPr lang="en-US" sz="4800" b="1" dirty="0" smtClean="0">
@@ -11877,66 +11851,54 @@
               <a:rPr lang="en-US" sz="4800" dirty="0" smtClean="0">
                 <a:latin typeface="Comic Sans MS" pitchFamily="66" charset="0"/>
               </a:rPr>
-              <a:t>1</a:t>
+              <a:t>1] is </a:t>
             </a:r>
             <a:r>
               <a:rPr lang="en-US" sz="4800" dirty="0" smtClean="0">
-                <a:latin typeface="Comic Sans MS" pitchFamily="66" charset="0"/>
-              </a:rPr>
-              <a:t>] is </a:t>
+                <a:solidFill>
+                  <a:srgbClr val="33CC33"/>
+                </a:solidFill>
+                <a:latin typeface="Comic Sans MS" pitchFamily="66" charset="0"/>
+              </a:rPr>
+              <a:t>T</a:t>
             </a:r>
             <a:r>
               <a:rPr lang="en-US" sz="4800" dirty="0" smtClean="0">
-                <a:solidFill>
-                  <a:srgbClr val="33CC33"/>
-                </a:solidFill>
-                <a:latin typeface="Comic Sans MS" pitchFamily="66" charset="0"/>
-              </a:rPr>
-              <a:t>T</a:t>
-            </a:r>
+                <a:latin typeface="Comic Sans MS" pitchFamily="66" charset="0"/>
+              </a:rPr>
+              <a:t> for x=0)</a:t>
+            </a:r>
+          </a:p>
+          <a:p>
             <a:r>
               <a:rPr lang="en-US" sz="4800" dirty="0" smtClean="0">
-                <a:latin typeface="Comic Sans MS" pitchFamily="66" charset="0"/>
-              </a:rPr>
-              <a:t> for x=0)</a:t>
-            </a:r>
-          </a:p>
-          <a:p>
+                <a:solidFill>
+                  <a:srgbClr val="0000FF"/>
+                </a:solidFill>
+                <a:latin typeface="Comic Sans MS" pitchFamily="66" charset="0"/>
+              </a:rPr>
+              <a:t>Q</a:t>
+            </a:r>
             <a:r>
               <a:rPr lang="en-US" sz="4800" dirty="0" smtClean="0">
-                <a:solidFill>
-                  <a:srgbClr val="0000FF"/>
-                </a:solidFill>
-                <a:latin typeface="Comic Sans MS" pitchFamily="66" charset="0"/>
-              </a:rPr>
-              <a:t>Q</a:t>
+                <a:latin typeface="Comic Sans MS" pitchFamily="66" charset="0"/>
+              </a:rPr>
+              <a:t>(0) is </a:t>
             </a:r>
             <a:r>
               <a:rPr lang="en-US" sz="4800" dirty="0" smtClean="0">
-                <a:latin typeface="Comic Sans MS" pitchFamily="66" charset="0"/>
-              </a:rPr>
-              <a:t>(0) is </a:t>
+                <a:solidFill>
+                  <a:srgbClr val="FF0000"/>
+                </a:solidFill>
+                <a:latin typeface="Comic Sans MS" pitchFamily="66" charset="0"/>
+              </a:rPr>
+              <a:t>F  </a:t>
             </a:r>
             <a:r>
               <a:rPr lang="en-US" sz="4800" dirty="0" smtClean="0">
-                <a:solidFill>
-                  <a:srgbClr val="FF0000"/>
-                </a:solidFill>
-                <a:latin typeface="Comic Sans MS" pitchFamily="66" charset="0"/>
-              </a:rPr>
-              <a:t>F  </a:t>
-            </a:r>
-            <a:r>
-              <a:rPr lang="en-US" sz="4800" dirty="0" smtClean="0">
-                <a:latin typeface="Comic Sans MS" pitchFamily="66" charset="0"/>
-              </a:rPr>
-              <a:t>([</a:t>
-            </a:r>
-            <a:r>
-              <a:rPr lang="en-US" sz="4800" dirty="0" smtClean="0">
-                <a:latin typeface="Comic Sans MS" pitchFamily="66" charset="0"/>
-              </a:rPr>
-              <a:t>x</a:t>
+                <a:latin typeface="Comic Sans MS" pitchFamily="66" charset="0"/>
+              </a:rPr>
+              <a:t>([x</a:t>
             </a:r>
             <a:r>
               <a:rPr lang="en-US" sz="4800" b="1" dirty="0" smtClean="0">
@@ -11949,13 +11911,7 @@
               <a:rPr lang="en-US" sz="4800" dirty="0" smtClean="0">
                 <a:latin typeface="Comic Sans MS" pitchFamily="66" charset="0"/>
               </a:rPr>
-              <a:t>0</a:t>
-            </a:r>
-            <a:r>
-              <a:rPr lang="en-US" sz="4800" dirty="0" smtClean="0">
-                <a:latin typeface="Comic Sans MS" pitchFamily="66" charset="0"/>
-              </a:rPr>
-              <a:t>] is </a:t>
+              <a:t>0] is </a:t>
             </a:r>
             <a:r>
               <a:rPr lang="en-US" sz="4800" dirty="0" smtClean="0">
@@ -12464,13 +12420,7 @@
               <a:rPr lang="en-US" sz="4800" dirty="0" smtClean="0">
                 <a:latin typeface="Comic Sans MS" pitchFamily="66" charset="0"/>
               </a:rPr>
-              <a:t>x. </a:t>
-            </a:r>
-            <a:r>
-              <a:rPr lang="en-US" sz="4800" dirty="0" smtClean="0">
-                <a:latin typeface="Comic Sans MS" pitchFamily="66" charset="0"/>
-              </a:rPr>
-              <a:t>x</a:t>
+              <a:t>x. x</a:t>
             </a:r>
             <a:r>
               <a:rPr lang="en-US" sz="4800" b="1" dirty="0" smtClean="0">
@@ -12485,9 +12435,6 @@
               </a:rPr>
               <a:t>y</a:t>
             </a:r>
-            <a:endParaRPr lang="en-US" sz="4800" dirty="0" smtClean="0">
-              <a:latin typeface="Comic Sans MS" pitchFamily="66" charset="0"/>
-            </a:endParaRPr>
           </a:p>
           <a:p>
             <a:r>
@@ -12518,13 +12465,7 @@
               <a:rPr lang="en-US" sz="4800" dirty="0" smtClean="0">
                 <a:latin typeface="Comic Sans MS" pitchFamily="66" charset="0"/>
               </a:rPr>
-              <a:t>([</a:t>
-            </a:r>
-            <a:r>
-              <a:rPr lang="en-US" sz="4800" dirty="0" smtClean="0">
-                <a:latin typeface="Comic Sans MS" pitchFamily="66" charset="0"/>
-              </a:rPr>
-              <a:t>x</a:t>
+              <a:t>([x</a:t>
             </a:r>
             <a:r>
               <a:rPr lang="en-US" sz="4800" b="1" dirty="0" smtClean="0">
@@ -12537,66 +12478,54 @@
               <a:rPr lang="en-US" sz="4800" dirty="0" smtClean="0">
                 <a:latin typeface="Comic Sans MS" pitchFamily="66" charset="0"/>
               </a:rPr>
-              <a:t>1</a:t>
+              <a:t>1] is </a:t>
             </a:r>
             <a:r>
               <a:rPr lang="en-US" sz="4800" dirty="0" smtClean="0">
-                <a:latin typeface="Comic Sans MS" pitchFamily="66" charset="0"/>
-              </a:rPr>
-              <a:t>] is </a:t>
+                <a:solidFill>
+                  <a:srgbClr val="FF0000"/>
+                </a:solidFill>
+                <a:latin typeface="Comic Sans MS" pitchFamily="66" charset="0"/>
+              </a:rPr>
+              <a:t>F</a:t>
             </a:r>
             <a:r>
               <a:rPr lang="en-US" sz="4800" dirty="0" smtClean="0">
+                <a:latin typeface="Comic Sans MS" pitchFamily="66" charset="0"/>
+              </a:rPr>
+              <a:t> for x=5)</a:t>
+            </a:r>
+          </a:p>
+          <a:p>
+            <a:r>
+              <a:rPr lang="en-US" sz="4800" dirty="0" smtClean="0">
+                <a:solidFill>
+                  <a:srgbClr val="0000FF"/>
+                </a:solidFill>
+                <a:latin typeface="Comic Sans MS" pitchFamily="66" charset="0"/>
+              </a:rPr>
+              <a:t>R</a:t>
+            </a:r>
+            <a:r>
+              <a:rPr lang="en-US" sz="4800" dirty="0" smtClean="0">
+                <a:latin typeface="Comic Sans MS" pitchFamily="66" charset="0"/>
+              </a:rPr>
+              <a:t>(8) is </a:t>
+            </a:r>
+            <a:r>
+              <a:rPr lang="en-US" sz="4800" dirty="0" smtClean="0">
                 <a:solidFill>
                   <a:srgbClr val="FF0000"/>
                 </a:solidFill>
                 <a:latin typeface="Comic Sans MS" pitchFamily="66" charset="0"/>
               </a:rPr>
-              <a:t>F</a:t>
+              <a:t>F </a:t>
             </a:r>
             <a:r>
               <a:rPr lang="en-US" sz="4800" dirty="0" smtClean="0">
                 <a:latin typeface="Comic Sans MS" pitchFamily="66" charset="0"/>
               </a:rPr>
-              <a:t> for x=5)</a:t>
-            </a:r>
-          </a:p>
-          <a:p>
-            <a:r>
-              <a:rPr lang="en-US" sz="4800" dirty="0" smtClean="0">
-                <a:solidFill>
-                  <a:srgbClr val="0000FF"/>
-                </a:solidFill>
-                <a:latin typeface="Comic Sans MS" pitchFamily="66" charset="0"/>
-              </a:rPr>
-              <a:t>R</a:t>
-            </a:r>
-            <a:r>
-              <a:rPr lang="en-US" sz="4800" dirty="0" smtClean="0">
-                <a:latin typeface="Comic Sans MS" pitchFamily="66" charset="0"/>
-              </a:rPr>
-              <a:t>(8) is </a:t>
-            </a:r>
-            <a:r>
-              <a:rPr lang="en-US" sz="4800" dirty="0" smtClean="0">
-                <a:solidFill>
-                  <a:srgbClr val="FF0000"/>
-                </a:solidFill>
-                <a:latin typeface="Comic Sans MS" pitchFamily="66" charset="0"/>
-              </a:rPr>
-              <a:t>F </a:t>
-            </a:r>
-            <a:r>
-              <a:rPr lang="en-US" sz="4800" dirty="0" smtClean="0">
-                <a:latin typeface="Comic Sans MS" pitchFamily="66" charset="0"/>
-              </a:rPr>
-              <a:t>([</a:t>
-            </a:r>
-            <a:r>
-              <a:rPr lang="en-US" sz="4800" dirty="0" smtClean="0">
-                <a:latin typeface="Comic Sans MS" pitchFamily="66" charset="0"/>
-              </a:rPr>
-              <a:t>x</a:t>
+              <a:t>([x</a:t>
             </a:r>
             <a:r>
               <a:rPr lang="en-US" sz="4800" b="1" dirty="0" smtClean="0">
@@ -12609,13 +12538,7 @@
               <a:rPr lang="en-US" sz="4800" dirty="0" smtClean="0">
                 <a:latin typeface="Comic Sans MS" pitchFamily="66" charset="0"/>
               </a:rPr>
-              <a:t>8</a:t>
-            </a:r>
-            <a:r>
-              <a:rPr lang="en-US" sz="4800" dirty="0" smtClean="0">
-                <a:latin typeface="Comic Sans MS" pitchFamily="66" charset="0"/>
-              </a:rPr>
-              <a:t>] is </a:t>
+              <a:t>8] is </a:t>
             </a:r>
             <a:r>
               <a:rPr lang="en-US" sz="4800" dirty="0" smtClean="0">
@@ -12676,13 +12599,7 @@
               <a:rPr lang="en-US" sz="4800" dirty="0" smtClean="0">
                 <a:latin typeface="Comic Sans MS" pitchFamily="66" charset="0"/>
               </a:rPr>
-              <a:t>  ([</a:t>
-            </a:r>
-            <a:r>
-              <a:rPr lang="en-US" sz="4800" dirty="0" smtClean="0">
-                <a:latin typeface="Comic Sans MS" pitchFamily="66" charset="0"/>
-              </a:rPr>
-              <a:t>x</a:t>
+              <a:t>  ([x</a:t>
             </a:r>
             <a:r>
               <a:rPr lang="en-US" sz="4800" b="1" dirty="0" smtClean="0">
@@ -13317,7 +13234,7 @@
           <a:graphicData uri="http://schemas.openxmlformats.org/presentationml/2006/ole">
             <mc:AlternateContent xmlns:mc="http://schemas.openxmlformats.org/markup-compatibility/2006">
               <mc:Choice xmlns:v="urn:schemas-microsoft-com:vml" Requires="v">
-                <p:oleObj spid="_x0000_s526376" name="Equation" r:id="rId4" imgW="1815840" imgH="457200" progId="Equation.DSMT4">
+                <p:oleObj spid="_x0000_s526378" name="Equation" r:id="rId4" imgW="1815840" imgH="457200" progId="Equation.DSMT4">
                   <p:embed/>
                 </p:oleObj>
               </mc:Choice>

</xml_diff>

<commit_message>
add pred-log5, edit 1-4
</commit_message>
<xml_diff>
--- a/spring16/slidesS16/predicate-logic1.pptx
+++ b/spring16/slidesS16/predicate-logic1.pptx
@@ -2745,8 +2745,8 @@
         </p:nvSpPr>
         <p:spPr bwMode="auto">
           <a:xfrm>
-            <a:off x="8285870" y="6556290"/>
-            <a:ext cx="848522" cy="261610"/>
+            <a:off x="8321274" y="6556290"/>
+            <a:ext cx="813118" cy="261610"/>
           </a:xfrm>
           <a:prstGeom prst="rect">
             <a:avLst/>
@@ -2768,22 +2768,13 @@
           <a:p>
             <a:pPr algn="r"/>
             <a:r>
-              <a:rPr lang="en-US" sz="1100" dirty="0" err="1">
+              <a:rPr lang="en-US" sz="1100" smtClean="0">
                 <a:solidFill>
                   <a:srgbClr val="000000"/>
                 </a:solidFill>
                 <a:latin typeface="Comic Sans MS" pitchFamily="66" charset="0"/>
               </a:rPr>
-              <a:t>lec</a:t>
-            </a:r>
-            <a:r>
-              <a:rPr lang="en-US" sz="1100" dirty="0" smtClean="0">
-                <a:solidFill>
-                  <a:srgbClr val="000000"/>
-                </a:solidFill>
-                <a:latin typeface="Comic Sans MS" pitchFamily="66" charset="0"/>
-              </a:rPr>
-              <a:t> 2F.</a:t>
+              <a:t>pred1.</a:t>
             </a:r>
             <a:fld id="{89C6A585-43E0-42A7-B7F4-EFE79D431EC1}" type="slidenum">
               <a:rPr lang="en-US" sz="1100" smtClean="0">
@@ -3960,7 +3951,7 @@
           <a:graphicData uri="http://schemas.openxmlformats.org/presentationml/2006/ole">
             <mc:AlternateContent xmlns:mc="http://schemas.openxmlformats.org/markup-compatibility/2006">
               <mc:Choice xmlns:v="urn:schemas-microsoft-com:vml" Requires="v">
-                <p:oleObj spid="_x0000_s527402" name="Equation" r:id="rId4" imgW="1765080" imgH="457200" progId="Equation.DSMT4">
+                <p:oleObj spid="_x0000_s527404" name="Equation" r:id="rId4" imgW="1765080" imgH="457200" progId="Equation.DSMT4">
                   <p:embed/>
                 </p:oleObj>
               </mc:Choice>
@@ -5745,7 +5736,7 @@
           <a:graphicData uri="http://schemas.openxmlformats.org/presentationml/2006/ole">
             <mc:AlternateContent xmlns:mc="http://schemas.openxmlformats.org/markup-compatibility/2006">
               <mc:Choice xmlns:v="urn:schemas-microsoft-com:vml" Requires="v">
-                <p:oleObj spid="_x0000_s479275" name="Equation" r:id="rId4" imgW="164880" imgH="164880" progId="Equation.DSMT4">
+                <p:oleObj spid="_x0000_s479277" name="Equation" r:id="rId4" imgW="164880" imgH="164880" progId="Equation.DSMT4">
                   <p:embed/>
                 </p:oleObj>
               </mc:Choice>
@@ -13234,7 +13225,7 @@
           <a:graphicData uri="http://schemas.openxmlformats.org/presentationml/2006/ole">
             <mc:AlternateContent xmlns:mc="http://schemas.openxmlformats.org/markup-compatibility/2006">
               <mc:Choice xmlns:v="urn:schemas-microsoft-com:vml" Requires="v">
-                <p:oleObj spid="_x0000_s526378" name="Equation" r:id="rId4" imgW="1815840" imgH="457200" progId="Equation.DSMT4">
+                <p:oleObj spid="_x0000_s526380" name="Equation" r:id="rId4" imgW="1815840" imgH="457200" progId="Equation.DSMT4">
                   <p:embed/>
                 </p:oleObj>
               </mc:Choice>

</xml_diff>